<commit_message>
Updated presentation with cross-validation slides
</commit_message>
<xml_diff>
--- a/Algorithm and data vs performance and accuracy - Presentation.pptx
+++ b/Algorithm and data vs performance and accuracy - Presentation.pptx
@@ -15,10 +15,12 @@
     <p:sldId id="262" r:id="rId9"/>
     <p:sldId id="272" r:id="rId10"/>
     <p:sldId id="271" r:id="rId11"/>
-    <p:sldId id="265" r:id="rId12"/>
-    <p:sldId id="266" r:id="rId13"/>
-    <p:sldId id="273" r:id="rId14"/>
-    <p:sldId id="274" r:id="rId15"/>
+    <p:sldId id="275" r:id="rId12"/>
+    <p:sldId id="276" r:id="rId13"/>
+    <p:sldId id="265" r:id="rId14"/>
+    <p:sldId id="266" r:id="rId15"/>
+    <p:sldId id="273" r:id="rId16"/>
+    <p:sldId id="274" r:id="rId17"/>
   </p:sldIdLst>
   <p:sldSz cx="12192000" cy="6858000"/>
   <p:notesSz cx="6858000" cy="9144000"/>
@@ -117,6 +119,11 @@
       </a:defRPr>
     </a:lvl9pPr>
   </p:defaultTextStyle>
+  <p:extLst>
+    <p:ext uri="{EFAFB233-063F-42B5-8137-9DF3F51BA10A}">
+      <p15:sldGuideLst xmlns:p15="http://schemas.microsoft.com/office/powerpoint/2012/main"/>
+    </p:ext>
+  </p:extLst>
 </p:presentation>
 </file>
 
@@ -3765,28 +3772,170 @@
         <p:spPr>
           <a:xfrm>
             <a:off x="838200" y="365126"/>
-            <a:ext cx="10515600" cy="484620"/>
+            <a:ext cx="10515600" cy="558518"/>
           </a:xfrm>
         </p:spPr>
         <p:txBody>
           <a:bodyPr>
-            <a:normAutofit fontScale="90000"/>
+            <a:normAutofit/>
           </a:bodyPr>
           <a:lstStyle/>
           <a:p>
             <a:r>
               <a:rPr lang="en-US" sz="3200" dirty="0"/>
-              <a:t>Processing time &amp; accuracy: prepare your data</a:t>
+              <a:t>Cross-validation to tune the model</a:t>
+            </a:r>
+          </a:p>
+        </p:txBody>
+      </p:sp>
+      <p:sp>
+        <p:nvSpPr>
+          <p:cNvPr id="3" name="TextBox 2">
+            <a:extLst>
+              <a:ext uri="{FF2B5EF4-FFF2-40B4-BE49-F238E27FC236}">
+                <a16:creationId xmlns:a16="http://schemas.microsoft.com/office/drawing/2014/main" id="{7D70959F-5C69-48C9-AE9D-F3F22D61245A}"/>
+              </a:ext>
+            </a:extLst>
+          </p:cNvPr>
+          <p:cNvSpPr txBox="1"/>
+          <p:nvPr/>
+        </p:nvSpPr>
+        <p:spPr>
+          <a:xfrm>
+            <a:off x="838200" y="997663"/>
+            <a:ext cx="6329218" cy="5201424"/>
+          </a:xfrm>
+          <a:prstGeom prst="rect">
+            <a:avLst/>
+          </a:prstGeom>
+          <a:noFill/>
+        </p:spPr>
+        <p:txBody>
+          <a:bodyPr wrap="square" rtlCol="0">
+            <a:spAutoFit/>
+          </a:bodyPr>
+          <a:lstStyle/>
+          <a:p>
+            <a:pPr marL="285750" indent="-285750">
+              <a:buFont typeface="Wingdings" panose="05000000000000000000" pitchFamily="2" charset="2"/>
+              <a:buChar char="Ø"/>
+            </a:pPr>
+            <a:r>
+              <a:rPr lang="en-US" dirty="0"/>
+              <a:t>To evaluate the performance of any ML model we need to test it on some unseen data. </a:t>
+            </a:r>
+          </a:p>
+          <a:p>
+            <a:pPr marL="742950" lvl="1" indent="-285750">
+              <a:buFont typeface="Arial" panose="020B0604020202020204" pitchFamily="34" charset="0"/>
+              <a:buChar char="•"/>
+            </a:pPr>
+            <a:r>
+              <a:rPr lang="en-US" sz="1600" dirty="0"/>
+              <a:t>based on the models performance on unseen data we can say weather our model is Under-fitting/Over-fitting/Well-</a:t>
+            </a:r>
+            <a:r>
+              <a:rPr lang="en-US" sz="1600" dirty="0" err="1"/>
+              <a:t>generalised</a:t>
+            </a:r>
+            <a:r>
+              <a:rPr lang="en-US" sz="1600" dirty="0"/>
+              <a:t>. </a:t>
+            </a:r>
+          </a:p>
+          <a:p>
+            <a:pPr marL="285750" indent="-285750">
+              <a:buFont typeface="Wingdings" panose="05000000000000000000" pitchFamily="2" charset="2"/>
+              <a:buChar char="Ø"/>
+            </a:pPr>
+            <a:r>
+              <a:rPr lang="en-US" dirty="0"/>
+              <a:t>Cross validation (CV) is one of the technique used to test the effectiveness of a model</a:t>
+            </a:r>
+          </a:p>
+          <a:p>
+            <a:pPr marL="742950" lvl="1" indent="-285750">
+              <a:buFont typeface="Arial" panose="020B0604020202020204" pitchFamily="34" charset="0"/>
+              <a:buChar char="•"/>
+            </a:pPr>
+            <a:r>
+              <a:rPr lang="en-US" sz="1600" dirty="0"/>
+              <a:t>it is also a re-sampling procedure used to evaluate a model if we have a limited data. </a:t>
+            </a:r>
+          </a:p>
+          <a:p>
+            <a:pPr marL="742950" lvl="1" indent="-285750">
+              <a:buFont typeface="Arial" panose="020B0604020202020204" pitchFamily="34" charset="0"/>
+              <a:buChar char="•"/>
+            </a:pPr>
+            <a:r>
+              <a:rPr lang="en-US" sz="1600" dirty="0"/>
+              <a:t>need to keep aside a sample/portion of the data on which is do not use to train the model, later us this sample for testing/validating </a:t>
+            </a:r>
+          </a:p>
+          <a:p>
+            <a:pPr marL="285750" indent="-285750">
+              <a:buFont typeface="Wingdings" panose="05000000000000000000" pitchFamily="2" charset="2"/>
+              <a:buChar char="Ø"/>
+            </a:pPr>
+            <a:r>
+              <a:rPr lang="en-US" sz="1600" dirty="0"/>
+              <a:t>Common methods used for CV:</a:t>
+            </a:r>
+          </a:p>
+          <a:p>
+            <a:pPr marL="742950" lvl="1" indent="-285750">
+              <a:buFont typeface="Wingdings" panose="05000000000000000000" pitchFamily="2" charset="2"/>
+              <a:buChar char="§"/>
+            </a:pPr>
+            <a:r>
+              <a:rPr lang="en-US" sz="1600" dirty="0"/>
+              <a:t>Train/Test Split </a:t>
+            </a:r>
+          </a:p>
+          <a:p>
+            <a:pPr lvl="2"/>
+            <a:r>
+              <a:rPr lang="en-US" sz="1400" dirty="0"/>
+              <a:t>randomly split the complete data into training and test sets, then Perform the model training on the training set and use the test set for validation purpose, ideally split the data into 70:30 or 80:20</a:t>
+            </a:r>
+          </a:p>
+          <a:p>
+            <a:pPr marL="742950" lvl="1" indent="-285750">
+              <a:buFont typeface="Wingdings" panose="05000000000000000000" pitchFamily="2" charset="2"/>
+              <a:buChar char="§"/>
+            </a:pPr>
+            <a:r>
+              <a:rPr lang="en-US" sz="1600" dirty="0"/>
+              <a:t>K-Folds Cross Validation</a:t>
+            </a:r>
+            <a:r>
+              <a:rPr lang="en-US" sz="1400" dirty="0"/>
+              <a:t>	</a:t>
+            </a:r>
+          </a:p>
+          <a:p>
+            <a:pPr lvl="2"/>
+            <a:r>
+              <a:rPr lang="en-US" sz="1400" dirty="0"/>
+              <a:t>has a single parameter called k that refers to the number of groups that a given data sample is to be split into</a:t>
+            </a:r>
+          </a:p>
+          <a:p>
+            <a:pPr lvl="1"/>
+            <a:r>
+              <a:rPr lang="en-US" sz="1400" dirty="0"/>
+              <a:t>			</a:t>
             </a:r>
           </a:p>
         </p:txBody>
       </p:sp>
       <p:pic>
         <p:nvPicPr>
-          <p:cNvPr id="6" name="Picture 5">
-            <a:extLst>
-              <a:ext uri="{FF2B5EF4-FFF2-40B4-BE49-F238E27FC236}">
-                <a16:creationId xmlns:a16="http://schemas.microsoft.com/office/drawing/2014/main" id="{07FFCE00-C4DE-42B2-BF8F-77ADE1E917CE}"/>
+          <p:cNvPr id="4" name="Picture 3">
+            <a:extLst>
+              <a:ext uri="{FF2B5EF4-FFF2-40B4-BE49-F238E27FC236}">
+                <a16:creationId xmlns:a16="http://schemas.microsoft.com/office/drawing/2014/main" id="{B4215878-48C3-446E-9B2C-A93832A59120}"/>
               </a:ext>
             </a:extLst>
           </p:cNvPr>
@@ -3803,8 +3952,8 @@
         </p:blipFill>
         <p:spPr>
           <a:xfrm>
-            <a:off x="6096000" y="1219200"/>
-            <a:ext cx="5151120" cy="3311434"/>
+            <a:off x="7675418" y="3637492"/>
+            <a:ext cx="3549292" cy="2407707"/>
           </a:xfrm>
           <a:prstGeom prst="rect">
             <a:avLst/>
@@ -3813,10 +3962,10 @@
       </p:pic>
       <p:pic>
         <p:nvPicPr>
-          <p:cNvPr id="3" name="Picture 2">
-            <a:extLst>
-              <a:ext uri="{FF2B5EF4-FFF2-40B4-BE49-F238E27FC236}">
-                <a16:creationId xmlns:a16="http://schemas.microsoft.com/office/drawing/2014/main" id="{2BA867AD-B047-49D4-976E-3C634228D7DA}"/>
+          <p:cNvPr id="5" name="Picture 4">
+            <a:extLst>
+              <a:ext uri="{FF2B5EF4-FFF2-40B4-BE49-F238E27FC236}">
+                <a16:creationId xmlns:a16="http://schemas.microsoft.com/office/drawing/2014/main" id="{254F0A2D-7297-4964-A32C-497C9309F915}"/>
               </a:ext>
             </a:extLst>
           </p:cNvPr>
@@ -3833,8 +3982,8 @@
         </p:blipFill>
         <p:spPr>
           <a:xfrm>
-            <a:off x="383313" y="3649539"/>
-            <a:ext cx="4711201" cy="3050961"/>
+            <a:off x="8159860" y="544271"/>
+            <a:ext cx="2757522" cy="2573687"/>
           </a:xfrm>
           <a:prstGeom prst="rect">
             <a:avLst/>
@@ -3843,10 +3992,10 @@
       </p:pic>
       <p:sp>
         <p:nvSpPr>
-          <p:cNvPr id="4" name="TextBox 3">
-            <a:extLst>
-              <a:ext uri="{FF2B5EF4-FFF2-40B4-BE49-F238E27FC236}">
-                <a16:creationId xmlns:a16="http://schemas.microsoft.com/office/drawing/2014/main" id="{19EDDE11-469B-46E4-8639-F430116A614F}"/>
+          <p:cNvPr id="6" name="TextBox 5">
+            <a:extLst>
+              <a:ext uri="{FF2B5EF4-FFF2-40B4-BE49-F238E27FC236}">
+                <a16:creationId xmlns:a16="http://schemas.microsoft.com/office/drawing/2014/main" id="{F4330398-91CA-4EE9-870C-2DD6E9BD672D}"/>
               </a:ext>
             </a:extLst>
           </p:cNvPr>
@@ -3855,8 +4004,8 @@
         </p:nvSpPr>
         <p:spPr>
           <a:xfrm>
-            <a:off x="850076" y="1219200"/>
-            <a:ext cx="4119088" cy="1754326"/>
+            <a:off x="8876145" y="3143215"/>
+            <a:ext cx="1478803" cy="307777"/>
           </a:xfrm>
           <a:prstGeom prst="rect">
             <a:avLst/>
@@ -3864,46 +4013,99 @@
           <a:noFill/>
         </p:spPr>
         <p:txBody>
+          <a:bodyPr wrap="none" rtlCol="0">
+            <a:spAutoFit/>
+          </a:bodyPr>
+          <a:lstStyle/>
+          <a:p>
+            <a:r>
+              <a:rPr lang="en-US" sz="1400" dirty="0"/>
+              <a:t>Train/test split CV</a:t>
+            </a:r>
+          </a:p>
+        </p:txBody>
+      </p:sp>
+      <p:sp>
+        <p:nvSpPr>
+          <p:cNvPr id="7" name="TextBox 6">
+            <a:extLst>
+              <a:ext uri="{FF2B5EF4-FFF2-40B4-BE49-F238E27FC236}">
+                <a16:creationId xmlns:a16="http://schemas.microsoft.com/office/drawing/2014/main" id="{2EE889D7-8409-40C3-A889-699EBC2E79FA}"/>
+              </a:ext>
+            </a:extLst>
+          </p:cNvPr>
+          <p:cNvSpPr txBox="1"/>
+          <p:nvPr/>
+        </p:nvSpPr>
+        <p:spPr>
+          <a:xfrm>
+            <a:off x="9019309" y="6045199"/>
+            <a:ext cx="881139" cy="307777"/>
+          </a:xfrm>
+          <a:prstGeom prst="rect">
+            <a:avLst/>
+          </a:prstGeom>
+          <a:noFill/>
+        </p:spPr>
+        <p:txBody>
+          <a:bodyPr wrap="none" rtlCol="0">
+            <a:spAutoFit/>
+          </a:bodyPr>
+          <a:lstStyle/>
+          <a:p>
+            <a:r>
+              <a:rPr lang="en-US" sz="1400" dirty="0"/>
+              <a:t>K-Fold CV</a:t>
+            </a:r>
+          </a:p>
+        </p:txBody>
+      </p:sp>
+      <p:sp>
+        <p:nvSpPr>
+          <p:cNvPr id="8" name="TextBox 7">
+            <a:extLst>
+              <a:ext uri="{FF2B5EF4-FFF2-40B4-BE49-F238E27FC236}">
+                <a16:creationId xmlns:a16="http://schemas.microsoft.com/office/drawing/2014/main" id="{29340304-C967-4D1B-8DC1-E2E31EFBEEAE}"/>
+              </a:ext>
+            </a:extLst>
+          </p:cNvPr>
+          <p:cNvSpPr txBox="1"/>
+          <p:nvPr/>
+        </p:nvSpPr>
+        <p:spPr>
+          <a:xfrm>
+            <a:off x="838199" y="6059647"/>
+            <a:ext cx="8767777" cy="523220"/>
+          </a:xfrm>
+          <a:prstGeom prst="rect">
+            <a:avLst/>
+          </a:prstGeom>
+          <a:noFill/>
+        </p:spPr>
+        <p:txBody>
           <a:bodyPr wrap="square" rtlCol="0">
             <a:spAutoFit/>
           </a:bodyPr>
           <a:lstStyle/>
           <a:p>
-            <a:pPr marL="285750" indent="-285750">
-              <a:buFont typeface="Arial" panose="020B0604020202020204" pitchFamily="34" charset="0"/>
-              <a:buChar char="•"/>
-            </a:pPr>
-            <a:r>
-              <a:rPr lang="en-US" dirty="0"/>
-              <a:t>Break the course of dimensionality: reduce</a:t>
-            </a:r>
-          </a:p>
-          <a:p>
-            <a:pPr marL="285750" indent="-285750">
-              <a:buFont typeface="Arial" panose="020B0604020202020204" pitchFamily="34" charset="0"/>
-              <a:buChar char="•"/>
-            </a:pPr>
-            <a:r>
-              <a:rPr lang="en-US" dirty="0"/>
-              <a:t>Apply PCA algorithms</a:t>
-            </a:r>
-          </a:p>
-          <a:p>
-            <a:pPr marL="285750" indent="-285750">
-              <a:buFont typeface="Arial" panose="020B0604020202020204" pitchFamily="34" charset="0"/>
-              <a:buChar char="•"/>
-            </a:pPr>
-            <a:r>
-              <a:rPr lang="en-US" dirty="0"/>
-              <a:t>Identify the number of dimensions that provide the highest reduction with preservation of a decent variance</a:t>
-            </a:r>
+            <a:r>
+              <a:rPr lang="en-US" sz="1400" dirty="0"/>
+              <a:t>Demo: </a:t>
+            </a:r>
+            <a:r>
+              <a:rPr lang="en-US" sz="1400" dirty="0">
+                <a:hlinkClick r:id="rId4"/>
+              </a:rPr>
+              <a:t>https://github.com/antongeorgescu/machine-learning-documentation/blob/master/scripts/WineQualityAnalysis_NaiveBayes_Correlation.ipynb</a:t>
+            </a:r>
+            <a:endParaRPr lang="en-US" sz="1400" dirty="0"/>
           </a:p>
         </p:txBody>
       </p:sp>
     </p:spTree>
     <p:extLst>
       <p:ext uri="{BB962C8B-B14F-4D97-AF65-F5344CB8AC3E}">
-        <p14:creationId xmlns:p14="http://schemas.microsoft.com/office/powerpoint/2010/main" val="2933728006"/>
+        <p14:creationId xmlns:p14="http://schemas.microsoft.com/office/powerpoint/2010/main" val="296972170"/>
       </p:ext>
     </p:extLst>
   </p:cSld>
@@ -3960,135 +4162,255 @@
           <a:p>
             <a:r>
               <a:rPr lang="en-US" sz="3200" dirty="0"/>
-              <a:t>Dimensions vs Performance</a:t>
-            </a:r>
-          </a:p>
-        </p:txBody>
-      </p:sp>
-      <p:pic>
-        <p:nvPicPr>
-          <p:cNvPr id="4" name="Picture 3">
-            <a:extLst>
-              <a:ext uri="{FF2B5EF4-FFF2-40B4-BE49-F238E27FC236}">
-                <a16:creationId xmlns:a16="http://schemas.microsoft.com/office/drawing/2014/main" id="{068AF125-13FA-4074-B2C9-D7E12093818B}"/>
-              </a:ext>
-            </a:extLst>
-          </p:cNvPr>
-          <p:cNvPicPr>
-            <a:picLocks noChangeAspect="1"/>
-          </p:cNvPicPr>
+              <a:t>Estimate algorithm accuracy through cross-validation</a:t>
+            </a:r>
+          </a:p>
+        </p:txBody>
+      </p:sp>
+      <p:sp>
+        <p:nvSpPr>
+          <p:cNvPr id="3" name="TextBox 2">
+            <a:extLst>
+              <a:ext uri="{FF2B5EF4-FFF2-40B4-BE49-F238E27FC236}">
+                <a16:creationId xmlns:a16="http://schemas.microsoft.com/office/drawing/2014/main" id="{7D70959F-5C69-48C9-AE9D-F3F22D61245A}"/>
+              </a:ext>
+            </a:extLst>
+          </p:cNvPr>
+          <p:cNvSpPr txBox="1"/>
           <p:nvPr/>
-        </p:nvPicPr>
-        <p:blipFill>
-          <a:blip r:embed="rId2"/>
-          <a:stretch>
-            <a:fillRect/>
-          </a:stretch>
-        </p:blipFill>
-        <p:spPr>
-          <a:xfrm>
-            <a:off x="933811" y="1219200"/>
-            <a:ext cx="4131058" cy="2686674"/>
+        </p:nvSpPr>
+        <p:spPr>
+          <a:xfrm>
+            <a:off x="1238250" y="1219200"/>
+            <a:ext cx="9256378" cy="5047536"/>
           </a:xfrm>
           <a:prstGeom prst="rect">
             <a:avLst/>
           </a:prstGeom>
-        </p:spPr>
-      </p:pic>
-      <p:pic>
-        <p:nvPicPr>
-          <p:cNvPr id="5" name="Picture 4">
-            <a:extLst>
-              <a:ext uri="{FF2B5EF4-FFF2-40B4-BE49-F238E27FC236}">
-                <a16:creationId xmlns:a16="http://schemas.microsoft.com/office/drawing/2014/main" id="{E48F07F7-1F2B-4012-9DD2-69A168BEB8BD}"/>
-              </a:ext>
-            </a:extLst>
-          </p:cNvPr>
-          <p:cNvPicPr>
-            <a:picLocks noChangeAspect="1"/>
-          </p:cNvPicPr>
-          <p:nvPr/>
-        </p:nvPicPr>
-        <p:blipFill>
-          <a:blip r:embed="rId3"/>
-          <a:stretch>
-            <a:fillRect/>
-          </a:stretch>
-        </p:blipFill>
-        <p:spPr>
-          <a:xfrm>
-            <a:off x="5484433" y="1219201"/>
-            <a:ext cx="4133088" cy="2686673"/>
-          </a:xfrm>
-          <a:prstGeom prst="rect">
-            <a:avLst/>
-          </a:prstGeom>
-        </p:spPr>
-      </p:pic>
-      <p:pic>
-        <p:nvPicPr>
-          <p:cNvPr id="7" name="Picture 6">
-            <a:extLst>
-              <a:ext uri="{FF2B5EF4-FFF2-40B4-BE49-F238E27FC236}">
-                <a16:creationId xmlns:a16="http://schemas.microsoft.com/office/drawing/2014/main" id="{3A5B4AB9-7A28-4EE1-917B-65D20EECF9D7}"/>
-              </a:ext>
-            </a:extLst>
-          </p:cNvPr>
-          <p:cNvPicPr>
-            <a:picLocks noChangeAspect="1"/>
-          </p:cNvPicPr>
-          <p:nvPr/>
-        </p:nvPicPr>
-        <p:blipFill>
-          <a:blip r:embed="rId4"/>
-          <a:stretch>
-            <a:fillRect/>
-          </a:stretch>
-        </p:blipFill>
-        <p:spPr>
-          <a:xfrm>
-            <a:off x="933811" y="3974831"/>
-            <a:ext cx="4131057" cy="2755631"/>
-          </a:xfrm>
-          <a:prstGeom prst="rect">
-            <a:avLst/>
-          </a:prstGeom>
-        </p:spPr>
-      </p:pic>
-      <p:pic>
-        <p:nvPicPr>
-          <p:cNvPr id="8" name="Picture 7">
-            <a:extLst>
-              <a:ext uri="{FF2B5EF4-FFF2-40B4-BE49-F238E27FC236}">
-                <a16:creationId xmlns:a16="http://schemas.microsoft.com/office/drawing/2014/main" id="{1ED3C00F-E9BD-4405-B062-665D07D359C7}"/>
-              </a:ext>
-            </a:extLst>
-          </p:cNvPr>
-          <p:cNvPicPr>
-            <a:picLocks noChangeAspect="1"/>
-          </p:cNvPicPr>
-          <p:nvPr/>
-        </p:nvPicPr>
-        <p:blipFill>
-          <a:blip r:embed="rId5"/>
-          <a:stretch>
-            <a:fillRect/>
-          </a:stretch>
-        </p:blipFill>
-        <p:spPr>
-          <a:xfrm>
-            <a:off x="5484431" y="3974831"/>
-            <a:ext cx="4131057" cy="2755631"/>
-          </a:xfrm>
-          <a:prstGeom prst="rect">
-            <a:avLst/>
-          </a:prstGeom>
-        </p:spPr>
-      </p:pic>
+          <a:noFill/>
+        </p:spPr>
+        <p:txBody>
+          <a:bodyPr wrap="square" rtlCol="0">
+            <a:spAutoFit/>
+          </a:bodyPr>
+          <a:lstStyle/>
+          <a:p>
+            <a:pPr marL="285750" indent="-285750">
+              <a:buFont typeface="Wingdings" panose="05000000000000000000" pitchFamily="2" charset="2"/>
+              <a:buChar char="Ø"/>
+            </a:pPr>
+            <a:r>
+              <a:rPr lang="en-US" sz="1600" dirty="0"/>
+              <a:t>estimate the accuracy of the 6 classifiers we use on the wine dataset by splitting the data, fitting each model and computing the score 5 consecutive times (with different splits each time)</a:t>
+            </a:r>
+          </a:p>
+          <a:p>
+            <a:pPr marL="285750" indent="-285750">
+              <a:buFont typeface="Wingdings" panose="05000000000000000000" pitchFamily="2" charset="2"/>
+              <a:buChar char="Ø"/>
+            </a:pPr>
+            <a:r>
+              <a:rPr lang="en-US" sz="1600" dirty="0"/>
+              <a:t>calculate the accuracy average over 5 iterations, for each classifier</a:t>
+            </a:r>
+          </a:p>
+          <a:p>
+            <a:pPr marL="285750" indent="-285750">
+              <a:buFont typeface="Wingdings" panose="05000000000000000000" pitchFamily="2" charset="2"/>
+              <a:buChar char="Ø"/>
+            </a:pPr>
+            <a:r>
+              <a:rPr lang="en-US" sz="1600" dirty="0"/>
+              <a:t>results for NO-SPLITS = 5</a:t>
+            </a:r>
+          </a:p>
+          <a:p>
+            <a:endParaRPr lang="en-US" dirty="0"/>
+          </a:p>
+          <a:p>
+            <a:pPr marL="742950" lvl="1" indent="-285750">
+              <a:buFont typeface="Wingdings" panose="05000000000000000000" pitchFamily="2" charset="2"/>
+              <a:buChar char="§"/>
+            </a:pPr>
+            <a:r>
+              <a:rPr lang="en-US" sz="1400" dirty="0"/>
+              <a:t>KNN Classifier</a:t>
+            </a:r>
+          </a:p>
+          <a:p>
+            <a:pPr lvl="2"/>
+            <a:r>
+              <a:rPr lang="en-US" sz="1200" dirty="0"/>
+              <a:t>[0.38728324 0.45417011 0.552436   0.53719008 0.5214876 ]	Accuracy: </a:t>
+            </a:r>
+            <a:r>
+              <a:rPr lang="en-US" sz="1200" b="1" dirty="0"/>
+              <a:t>0.49</a:t>
+            </a:r>
+            <a:r>
+              <a:rPr lang="en-US" sz="1200" dirty="0"/>
+              <a:t> (+/- 0.12)</a:t>
+            </a:r>
+          </a:p>
+          <a:p>
+            <a:pPr lvl="2"/>
+            <a:endParaRPr lang="en-US" sz="1200" dirty="0"/>
+          </a:p>
+          <a:p>
+            <a:pPr marL="742950" lvl="1" indent="-285750">
+              <a:buFont typeface="Wingdings" panose="05000000000000000000" pitchFamily="2" charset="2"/>
+              <a:buChar char="§"/>
+            </a:pPr>
+            <a:r>
+              <a:rPr lang="en-US" sz="1400" dirty="0"/>
+              <a:t>SVM Classifier</a:t>
+            </a:r>
+          </a:p>
+          <a:p>
+            <a:pPr lvl="2"/>
+            <a:r>
+              <a:rPr lang="en-US" sz="1200" dirty="0"/>
+              <a:t>[0.47563997 0.47811726 0.56647399 0.5768595  0.5661157 ]	Accuracy: </a:t>
+            </a:r>
+            <a:r>
+              <a:rPr lang="en-US" sz="1200" b="1" dirty="0"/>
+              <a:t>0.53</a:t>
+            </a:r>
+            <a:r>
+              <a:rPr lang="en-US" sz="1200" dirty="0"/>
+              <a:t> (+/- 0.09)</a:t>
+            </a:r>
+          </a:p>
+          <a:p>
+            <a:pPr lvl="2"/>
+            <a:endParaRPr lang="en-US" sz="1400" dirty="0"/>
+          </a:p>
+          <a:p>
+            <a:pPr marL="742950" lvl="1" indent="-285750">
+              <a:buFont typeface="Wingdings" panose="05000000000000000000" pitchFamily="2" charset="2"/>
+              <a:buChar char="§"/>
+            </a:pPr>
+            <a:r>
+              <a:rPr lang="en-US" sz="1400" dirty="0"/>
+              <a:t>Logistic Regression Classifier</a:t>
+            </a:r>
+          </a:p>
+          <a:p>
+            <a:pPr lvl="2"/>
+            <a:r>
+              <a:rPr lang="en-US" sz="1200" dirty="0"/>
+              <a:t>[0.46490504 0.48472337 0.57060281 0.59008264 0.55867769]	Accuracy: </a:t>
+            </a:r>
+            <a:r>
+              <a:rPr lang="en-US" sz="1200" b="1" dirty="0"/>
+              <a:t>0.53</a:t>
+            </a:r>
+            <a:r>
+              <a:rPr lang="en-US" sz="1200" dirty="0"/>
+              <a:t> (+/- 0.10)</a:t>
+            </a:r>
+          </a:p>
+          <a:p>
+            <a:pPr lvl="2"/>
+            <a:endParaRPr lang="en-US" sz="1200" dirty="0"/>
+          </a:p>
+          <a:p>
+            <a:pPr marL="742950" lvl="1" indent="-285750">
+              <a:buFont typeface="Wingdings" panose="05000000000000000000" pitchFamily="2" charset="2"/>
+              <a:buChar char="§"/>
+            </a:pPr>
+            <a:r>
+              <a:rPr lang="en-US" sz="1400" dirty="0"/>
+              <a:t>Random Forest Classifier</a:t>
+            </a:r>
+          </a:p>
+          <a:p>
+            <a:pPr lvl="2"/>
+            <a:r>
+              <a:rPr lang="en-US" sz="1200" dirty="0"/>
+              <a:t>[0.45334434 0.50289017 0.5821635  0.57768595 0.56198347]	Accuracy: </a:t>
+            </a:r>
+            <a:r>
+              <a:rPr lang="en-US" sz="1200" b="1" dirty="0"/>
+              <a:t>0.54</a:t>
+            </a:r>
+            <a:r>
+              <a:rPr lang="en-US" sz="1200" dirty="0"/>
+              <a:t> (+/- 0.10)</a:t>
+            </a:r>
+          </a:p>
+          <a:p>
+            <a:pPr lvl="2"/>
+            <a:endParaRPr lang="en-US" sz="1200" dirty="0"/>
+          </a:p>
+          <a:p>
+            <a:pPr marL="742950" lvl="1" indent="-285750">
+              <a:buFont typeface="Wingdings" panose="05000000000000000000" pitchFamily="2" charset="2"/>
+              <a:buChar char="§"/>
+            </a:pPr>
+            <a:r>
+              <a:rPr lang="en-US" sz="1400" dirty="0"/>
+              <a:t>Decision Tree Classifier</a:t>
+            </a:r>
+          </a:p>
+          <a:p>
+            <a:pPr lvl="2"/>
+            <a:r>
+              <a:rPr lang="en-US" sz="1200" dirty="0"/>
+              <a:t>[0.45995045 0.48142031 0.50619323 0.53966942 0.52231405]	Accuracy: </a:t>
+            </a:r>
+            <a:r>
+              <a:rPr lang="en-US" sz="1200" b="1" dirty="0"/>
+              <a:t>0.50</a:t>
+            </a:r>
+            <a:r>
+              <a:rPr lang="en-US" sz="1200" dirty="0"/>
+              <a:t> (+/- 0.06) </a:t>
+            </a:r>
+          </a:p>
+          <a:p>
+            <a:pPr lvl="2"/>
+            <a:endParaRPr lang="en-US" sz="1200" dirty="0"/>
+          </a:p>
+          <a:p>
+            <a:pPr marL="628650" lvl="1" indent="-171450">
+              <a:buFont typeface="Wingdings" panose="05000000000000000000" pitchFamily="2" charset="2"/>
+              <a:buChar char="§"/>
+            </a:pPr>
+            <a:r>
+              <a:rPr lang="en-US" sz="1200" dirty="0"/>
+              <a:t>   </a:t>
+            </a:r>
+            <a:r>
+              <a:rPr lang="en-US" sz="1400" dirty="0"/>
+              <a:t>Naïve Bayes Classifier</a:t>
+            </a:r>
+          </a:p>
+          <a:p>
+            <a:pPr lvl="2"/>
+            <a:r>
+              <a:rPr lang="en-US" sz="1200" dirty="0"/>
+              <a:t>[0.36746491 0.50949628 0.46738233 0.45867769 0.37933884]                  Accuracy: </a:t>
+            </a:r>
+            <a:r>
+              <a:rPr lang="en-US" sz="1200" b="1" dirty="0"/>
+              <a:t>0.44</a:t>
+            </a:r>
+            <a:r>
+              <a:rPr lang="en-US" sz="1200" dirty="0"/>
+              <a:t> (+/- 0.11)</a:t>
+            </a:r>
+          </a:p>
+          <a:p>
+            <a:pPr lvl="2"/>
+            <a:endParaRPr lang="en-US" sz="1200" dirty="0"/>
+          </a:p>
+        </p:txBody>
+      </p:sp>
     </p:spTree>
     <p:extLst>
       <p:ext uri="{BB962C8B-B14F-4D97-AF65-F5344CB8AC3E}">
-        <p14:creationId xmlns:p14="http://schemas.microsoft.com/office/powerpoint/2010/main" val="1896600161"/>
+        <p14:creationId xmlns:p14="http://schemas.microsoft.com/office/powerpoint/2010/main" val="305973575"/>
       </p:ext>
     </p:extLst>
   </p:cSld>
@@ -4133,6 +4455,375 @@
         </p:nvSpPr>
         <p:spPr>
           <a:xfrm>
+            <a:off x="838200" y="365126"/>
+            <a:ext cx="10515600" cy="484620"/>
+          </a:xfrm>
+        </p:spPr>
+        <p:txBody>
+          <a:bodyPr>
+            <a:normAutofit fontScale="90000"/>
+          </a:bodyPr>
+          <a:lstStyle/>
+          <a:p>
+            <a:r>
+              <a:rPr lang="en-US" sz="3200" dirty="0"/>
+              <a:t>Processing time &amp; accuracy: prepare your data</a:t>
+            </a:r>
+          </a:p>
+        </p:txBody>
+      </p:sp>
+      <p:pic>
+        <p:nvPicPr>
+          <p:cNvPr id="6" name="Picture 5">
+            <a:extLst>
+              <a:ext uri="{FF2B5EF4-FFF2-40B4-BE49-F238E27FC236}">
+                <a16:creationId xmlns:a16="http://schemas.microsoft.com/office/drawing/2014/main" id="{07FFCE00-C4DE-42B2-BF8F-77ADE1E917CE}"/>
+              </a:ext>
+            </a:extLst>
+          </p:cNvPr>
+          <p:cNvPicPr>
+            <a:picLocks noChangeAspect="1"/>
+          </p:cNvPicPr>
+          <p:nvPr/>
+        </p:nvPicPr>
+        <p:blipFill>
+          <a:blip r:embed="rId2"/>
+          <a:stretch>
+            <a:fillRect/>
+          </a:stretch>
+        </p:blipFill>
+        <p:spPr>
+          <a:xfrm>
+            <a:off x="6096000" y="1219200"/>
+            <a:ext cx="5151120" cy="3311434"/>
+          </a:xfrm>
+          <a:prstGeom prst="rect">
+            <a:avLst/>
+          </a:prstGeom>
+        </p:spPr>
+      </p:pic>
+      <p:pic>
+        <p:nvPicPr>
+          <p:cNvPr id="3" name="Picture 2">
+            <a:extLst>
+              <a:ext uri="{FF2B5EF4-FFF2-40B4-BE49-F238E27FC236}">
+                <a16:creationId xmlns:a16="http://schemas.microsoft.com/office/drawing/2014/main" id="{2BA867AD-B047-49D4-976E-3C634228D7DA}"/>
+              </a:ext>
+            </a:extLst>
+          </p:cNvPr>
+          <p:cNvPicPr>
+            <a:picLocks noChangeAspect="1"/>
+          </p:cNvPicPr>
+          <p:nvPr/>
+        </p:nvPicPr>
+        <p:blipFill>
+          <a:blip r:embed="rId3"/>
+          <a:stretch>
+            <a:fillRect/>
+          </a:stretch>
+        </p:blipFill>
+        <p:spPr>
+          <a:xfrm>
+            <a:off x="383313" y="3649539"/>
+            <a:ext cx="4711201" cy="3050961"/>
+          </a:xfrm>
+          <a:prstGeom prst="rect">
+            <a:avLst/>
+          </a:prstGeom>
+        </p:spPr>
+      </p:pic>
+      <p:sp>
+        <p:nvSpPr>
+          <p:cNvPr id="4" name="TextBox 3">
+            <a:extLst>
+              <a:ext uri="{FF2B5EF4-FFF2-40B4-BE49-F238E27FC236}">
+                <a16:creationId xmlns:a16="http://schemas.microsoft.com/office/drawing/2014/main" id="{19EDDE11-469B-46E4-8639-F430116A614F}"/>
+              </a:ext>
+            </a:extLst>
+          </p:cNvPr>
+          <p:cNvSpPr txBox="1"/>
+          <p:nvPr/>
+        </p:nvSpPr>
+        <p:spPr>
+          <a:xfrm>
+            <a:off x="850076" y="1219200"/>
+            <a:ext cx="4119088" cy="1754326"/>
+          </a:xfrm>
+          <a:prstGeom prst="rect">
+            <a:avLst/>
+          </a:prstGeom>
+          <a:noFill/>
+        </p:spPr>
+        <p:txBody>
+          <a:bodyPr wrap="square" rtlCol="0">
+            <a:spAutoFit/>
+          </a:bodyPr>
+          <a:lstStyle/>
+          <a:p>
+            <a:pPr marL="285750" indent="-285750">
+              <a:buFont typeface="Arial" panose="020B0604020202020204" pitchFamily="34" charset="0"/>
+              <a:buChar char="•"/>
+            </a:pPr>
+            <a:r>
+              <a:rPr lang="en-US" dirty="0"/>
+              <a:t>Break the course of dimensionality: reduce</a:t>
+            </a:r>
+          </a:p>
+          <a:p>
+            <a:pPr marL="285750" indent="-285750">
+              <a:buFont typeface="Arial" panose="020B0604020202020204" pitchFamily="34" charset="0"/>
+              <a:buChar char="•"/>
+            </a:pPr>
+            <a:r>
+              <a:rPr lang="en-US" dirty="0"/>
+              <a:t>Apply PCA algorithms</a:t>
+            </a:r>
+          </a:p>
+          <a:p>
+            <a:pPr marL="285750" indent="-285750">
+              <a:buFont typeface="Arial" panose="020B0604020202020204" pitchFamily="34" charset="0"/>
+              <a:buChar char="•"/>
+            </a:pPr>
+            <a:r>
+              <a:rPr lang="en-US" dirty="0"/>
+              <a:t>Identify the number of dimensions that provide the highest reduction with preservation of a decent variance</a:t>
+            </a:r>
+          </a:p>
+        </p:txBody>
+      </p:sp>
+    </p:spTree>
+    <p:extLst>
+      <p:ext uri="{BB962C8B-B14F-4D97-AF65-F5344CB8AC3E}">
+        <p14:creationId xmlns:p14="http://schemas.microsoft.com/office/powerpoint/2010/main" val="2933728006"/>
+      </p:ext>
+    </p:extLst>
+  </p:cSld>
+  <p:clrMapOvr>
+    <a:masterClrMapping/>
+  </p:clrMapOvr>
+</p:sld>
+</file>
+
+<file path=ppt/slides/slide14.xml><?xml version="1.0" encoding="utf-8"?>
+<p:sld xmlns:a="http://schemas.openxmlformats.org/drawingml/2006/main" xmlns:r="http://schemas.openxmlformats.org/officeDocument/2006/relationships" xmlns:p="http://schemas.openxmlformats.org/presentationml/2006/main">
+  <p:cSld>
+    <p:spTree>
+      <p:nvGrpSpPr>
+        <p:cNvPr id="1" name=""/>
+        <p:cNvGrpSpPr/>
+        <p:nvPr/>
+      </p:nvGrpSpPr>
+      <p:grpSpPr>
+        <a:xfrm>
+          <a:off x="0" y="0"/>
+          <a:ext cx="0" cy="0"/>
+          <a:chOff x="0" y="0"/>
+          <a:chExt cx="0" cy="0"/>
+        </a:xfrm>
+      </p:grpSpPr>
+      <p:sp>
+        <p:nvSpPr>
+          <p:cNvPr id="2" name="Title 1">
+            <a:extLst>
+              <a:ext uri="{FF2B5EF4-FFF2-40B4-BE49-F238E27FC236}">
+                <a16:creationId xmlns:a16="http://schemas.microsoft.com/office/drawing/2014/main" id="{87929F08-C55A-436F-9696-B8E284D7F8AD}"/>
+              </a:ext>
+            </a:extLst>
+          </p:cNvPr>
+          <p:cNvSpPr>
+            <a:spLocks noGrp="1"/>
+          </p:cNvSpPr>
+          <p:nvPr>
+            <p:ph type="title"/>
+          </p:nvPr>
+        </p:nvSpPr>
+        <p:spPr>
+          <a:xfrm>
+            <a:off x="838200" y="365125"/>
+            <a:ext cx="10515600" cy="854075"/>
+          </a:xfrm>
+        </p:spPr>
+        <p:txBody>
+          <a:bodyPr>
+            <a:normAutofit/>
+          </a:bodyPr>
+          <a:lstStyle/>
+          <a:p>
+            <a:r>
+              <a:rPr lang="en-US" sz="3200" dirty="0"/>
+              <a:t>Dimensions vs Performance</a:t>
+            </a:r>
+          </a:p>
+        </p:txBody>
+      </p:sp>
+      <p:pic>
+        <p:nvPicPr>
+          <p:cNvPr id="4" name="Picture 3">
+            <a:extLst>
+              <a:ext uri="{FF2B5EF4-FFF2-40B4-BE49-F238E27FC236}">
+                <a16:creationId xmlns:a16="http://schemas.microsoft.com/office/drawing/2014/main" id="{068AF125-13FA-4074-B2C9-D7E12093818B}"/>
+              </a:ext>
+            </a:extLst>
+          </p:cNvPr>
+          <p:cNvPicPr>
+            <a:picLocks noChangeAspect="1"/>
+          </p:cNvPicPr>
+          <p:nvPr/>
+        </p:nvPicPr>
+        <p:blipFill>
+          <a:blip r:embed="rId2"/>
+          <a:stretch>
+            <a:fillRect/>
+          </a:stretch>
+        </p:blipFill>
+        <p:spPr>
+          <a:xfrm>
+            <a:off x="933811" y="1219200"/>
+            <a:ext cx="4131058" cy="2686674"/>
+          </a:xfrm>
+          <a:prstGeom prst="rect">
+            <a:avLst/>
+          </a:prstGeom>
+        </p:spPr>
+      </p:pic>
+      <p:pic>
+        <p:nvPicPr>
+          <p:cNvPr id="5" name="Picture 4">
+            <a:extLst>
+              <a:ext uri="{FF2B5EF4-FFF2-40B4-BE49-F238E27FC236}">
+                <a16:creationId xmlns:a16="http://schemas.microsoft.com/office/drawing/2014/main" id="{E48F07F7-1F2B-4012-9DD2-69A168BEB8BD}"/>
+              </a:ext>
+            </a:extLst>
+          </p:cNvPr>
+          <p:cNvPicPr>
+            <a:picLocks noChangeAspect="1"/>
+          </p:cNvPicPr>
+          <p:nvPr/>
+        </p:nvPicPr>
+        <p:blipFill>
+          <a:blip r:embed="rId3"/>
+          <a:stretch>
+            <a:fillRect/>
+          </a:stretch>
+        </p:blipFill>
+        <p:spPr>
+          <a:xfrm>
+            <a:off x="5484433" y="1219201"/>
+            <a:ext cx="4133088" cy="2686673"/>
+          </a:xfrm>
+          <a:prstGeom prst="rect">
+            <a:avLst/>
+          </a:prstGeom>
+        </p:spPr>
+      </p:pic>
+      <p:pic>
+        <p:nvPicPr>
+          <p:cNvPr id="7" name="Picture 6">
+            <a:extLst>
+              <a:ext uri="{FF2B5EF4-FFF2-40B4-BE49-F238E27FC236}">
+                <a16:creationId xmlns:a16="http://schemas.microsoft.com/office/drawing/2014/main" id="{3A5B4AB9-7A28-4EE1-917B-65D20EECF9D7}"/>
+              </a:ext>
+            </a:extLst>
+          </p:cNvPr>
+          <p:cNvPicPr>
+            <a:picLocks noChangeAspect="1"/>
+          </p:cNvPicPr>
+          <p:nvPr/>
+        </p:nvPicPr>
+        <p:blipFill>
+          <a:blip r:embed="rId4"/>
+          <a:stretch>
+            <a:fillRect/>
+          </a:stretch>
+        </p:blipFill>
+        <p:spPr>
+          <a:xfrm>
+            <a:off x="933811" y="3974831"/>
+            <a:ext cx="4131057" cy="2755631"/>
+          </a:xfrm>
+          <a:prstGeom prst="rect">
+            <a:avLst/>
+          </a:prstGeom>
+        </p:spPr>
+      </p:pic>
+      <p:pic>
+        <p:nvPicPr>
+          <p:cNvPr id="8" name="Picture 7">
+            <a:extLst>
+              <a:ext uri="{FF2B5EF4-FFF2-40B4-BE49-F238E27FC236}">
+                <a16:creationId xmlns:a16="http://schemas.microsoft.com/office/drawing/2014/main" id="{1ED3C00F-E9BD-4405-B062-665D07D359C7}"/>
+              </a:ext>
+            </a:extLst>
+          </p:cNvPr>
+          <p:cNvPicPr>
+            <a:picLocks noChangeAspect="1"/>
+          </p:cNvPicPr>
+          <p:nvPr/>
+        </p:nvPicPr>
+        <p:blipFill>
+          <a:blip r:embed="rId5"/>
+          <a:stretch>
+            <a:fillRect/>
+          </a:stretch>
+        </p:blipFill>
+        <p:spPr>
+          <a:xfrm>
+            <a:off x="5484431" y="3974831"/>
+            <a:ext cx="4131057" cy="2755631"/>
+          </a:xfrm>
+          <a:prstGeom prst="rect">
+            <a:avLst/>
+          </a:prstGeom>
+        </p:spPr>
+      </p:pic>
+    </p:spTree>
+    <p:extLst>
+      <p:ext uri="{BB962C8B-B14F-4D97-AF65-F5344CB8AC3E}">
+        <p14:creationId xmlns:p14="http://schemas.microsoft.com/office/powerpoint/2010/main" val="1896600161"/>
+      </p:ext>
+    </p:extLst>
+  </p:cSld>
+  <p:clrMapOvr>
+    <a:masterClrMapping/>
+  </p:clrMapOvr>
+</p:sld>
+</file>
+
+<file path=ppt/slides/slide15.xml><?xml version="1.0" encoding="utf-8"?>
+<p:sld xmlns:a="http://schemas.openxmlformats.org/drawingml/2006/main" xmlns:r="http://schemas.openxmlformats.org/officeDocument/2006/relationships" xmlns:p="http://schemas.openxmlformats.org/presentationml/2006/main">
+  <p:cSld>
+    <p:spTree>
+      <p:nvGrpSpPr>
+        <p:cNvPr id="1" name=""/>
+        <p:cNvGrpSpPr/>
+        <p:nvPr/>
+      </p:nvGrpSpPr>
+      <p:grpSpPr>
+        <a:xfrm>
+          <a:off x="0" y="0"/>
+          <a:ext cx="0" cy="0"/>
+          <a:chOff x="0" y="0"/>
+          <a:chExt cx="0" cy="0"/>
+        </a:xfrm>
+      </p:grpSpPr>
+      <p:sp>
+        <p:nvSpPr>
+          <p:cNvPr id="2" name="Title 1">
+            <a:extLst>
+              <a:ext uri="{FF2B5EF4-FFF2-40B4-BE49-F238E27FC236}">
+                <a16:creationId xmlns:a16="http://schemas.microsoft.com/office/drawing/2014/main" id="{87929F08-C55A-436F-9696-B8E284D7F8AD}"/>
+              </a:ext>
+            </a:extLst>
+          </p:cNvPr>
+          <p:cNvSpPr>
+            <a:spLocks noGrp="1"/>
+          </p:cNvSpPr>
+          <p:nvPr>
+            <p:ph type="title"/>
+          </p:nvPr>
+        </p:nvSpPr>
+        <p:spPr>
+          <a:xfrm>
             <a:off x="838200" y="365125"/>
             <a:ext cx="10515600" cy="520689"/>
           </a:xfrm>
@@ -4589,7 +5280,7 @@
 </p:sld>
 </file>
 
-<file path=ppt/slides/slide14.xml><?xml version="1.0" encoding="utf-8"?>
+<file path=ppt/slides/slide16.xml><?xml version="1.0" encoding="utf-8"?>
 <p:sld xmlns:a="http://schemas.openxmlformats.org/drawingml/2006/main" xmlns:r="http://schemas.openxmlformats.org/officeDocument/2006/relationships" xmlns:p="http://schemas.openxmlformats.org/presentationml/2006/main">
   <p:cSld>
     <p:spTree>
@@ -4831,7 +5522,7 @@
         <p:spPr>
           <a:xfrm>
             <a:off x="1212850" y="1409701"/>
-            <a:ext cx="9404350" cy="3970318"/>
+            <a:ext cx="9404350" cy="4524315"/>
           </a:xfrm>
           <a:prstGeom prst="rect">
             <a:avLst/>
@@ -4922,6 +5613,27 @@
               <a:rPr lang="en-US" dirty="0"/>
               <a:t>Processing time &amp; accuracy: compare algorithms</a:t>
             </a:r>
+          </a:p>
+          <a:p>
+            <a:pPr marL="800100" lvl="1" indent="-342900">
+              <a:buFont typeface="Wingdings" panose="05000000000000000000" pitchFamily="2" charset="2"/>
+              <a:buChar char="v"/>
+            </a:pPr>
+            <a:r>
+              <a:rPr lang="en-US" dirty="0"/>
+              <a:t>Cross-validation to tune the model</a:t>
+            </a:r>
+          </a:p>
+          <a:p>
+            <a:pPr marL="800100" lvl="1" indent="-342900">
+              <a:buFont typeface="Wingdings" panose="05000000000000000000" pitchFamily="2" charset="2"/>
+              <a:buChar char="v"/>
+            </a:pPr>
+            <a:r>
+              <a:rPr lang="en-US"/>
+              <a:t>Estimate algorithm accuracy through cross-validation</a:t>
+            </a:r>
+            <a:endParaRPr lang="en-US" dirty="0"/>
           </a:p>
           <a:p>
             <a:pPr marL="342900" indent="-342900">
@@ -6044,8 +6756,8 @@
         </p:nvSpPr>
         <p:spPr>
           <a:xfrm>
-            <a:off x="201627" y="6059647"/>
-            <a:ext cx="9404350" cy="523220"/>
+            <a:off x="838199" y="6059647"/>
+            <a:ext cx="8767777" cy="523220"/>
           </a:xfrm>
           <a:prstGeom prst="rect">
             <a:avLst/>
@@ -6058,10 +6770,6 @@
           </a:bodyPr>
           <a:lstStyle/>
           <a:p>
-            <a:pPr marL="285750" indent="-285750">
-              <a:buFont typeface="Wingdings" panose="05000000000000000000" pitchFamily="2" charset="2"/>
-              <a:buChar char="Ø"/>
-            </a:pPr>
             <a:r>
               <a:rPr lang="en-US" sz="1400" dirty="0"/>
               <a:t>Demo: </a:t>

</xml_diff>